<commit_message>
update slide rest api!!
</commit_message>
<xml_diff>
--- a/RESTAPI/RestAPI.pptx
+++ b/RESTAPI/RestAPI.pptx
@@ -9,7 +9,8 @@
     <p:sldId id="257" r:id="rId3"/>
     <p:sldId id="258" r:id="rId4"/>
     <p:sldId id="259" r:id="rId5"/>
-    <p:sldId id="260" r:id="rId6"/>
+    <p:sldId id="261" r:id="rId6"/>
+    <p:sldId id="260" r:id="rId7"/>
   </p:sldIdLst>
   <p:sldSz cx="12192000" cy="6858000"/>
   <p:notesSz cx="6858000" cy="9144000"/>
@@ -286,7 +287,7 @@
           <a:p>
             <a:fld id="{48A87A34-81AB-432B-8DAE-1953F412C126}" type="datetimeFigureOut">
               <a:rPr lang="en-US" dirty="0"/>
-              <a:t>11/14/19</a:t>
+              <a:t>2/10/20</a:t>
             </a:fld>
             <a:endParaRPr lang="en-US" dirty="0"/>
           </a:p>
@@ -548,7 +549,7 @@
           <a:p>
             <a:fld id="{48A87A34-81AB-432B-8DAE-1953F412C126}" type="datetimeFigureOut">
               <a:rPr lang="en-US" dirty="0"/>
-              <a:t>11/14/19</a:t>
+              <a:t>2/10/20</a:t>
             </a:fld>
             <a:endParaRPr lang="en-US" dirty="0"/>
           </a:p>
@@ -775,7 +776,7 @@
             <a:fld id="{48A87A34-81AB-432B-8DAE-1953F412C126}" type="datetimeFigureOut">
               <a:rPr lang="en-US" dirty="0"/>
               <a:pPr/>
-              <a:t>11/14/19</a:t>
+              <a:t>2/10/20</a:t>
             </a:fld>
             <a:endParaRPr lang="en-US" dirty="0"/>
           </a:p>
@@ -1081,7 +1082,7 @@
             <a:fld id="{48A87A34-81AB-432B-8DAE-1953F412C126}" type="datetimeFigureOut">
               <a:rPr lang="en-US" dirty="0"/>
               <a:pPr/>
-              <a:t>11/14/19</a:t>
+              <a:t>2/10/20</a:t>
             </a:fld>
             <a:endParaRPr lang="en-US" dirty="0"/>
           </a:p>
@@ -1550,7 +1551,7 @@
             <a:fld id="{48A87A34-81AB-432B-8DAE-1953F412C126}" type="datetimeFigureOut">
               <a:rPr lang="en-US" dirty="0"/>
               <a:pPr/>
-              <a:t>11/14/19</a:t>
+              <a:t>2/10/20</a:t>
             </a:fld>
             <a:endParaRPr lang="en-US" dirty="0"/>
           </a:p>
@@ -2092,7 +2093,7 @@
           <a:p>
             <a:fld id="{48A87A34-81AB-432B-8DAE-1953F412C126}" type="datetimeFigureOut">
               <a:rPr lang="en-US" dirty="0"/>
-              <a:t>11/14/19</a:t>
+              <a:t>2/10/20</a:t>
             </a:fld>
             <a:endParaRPr lang="en-US" dirty="0"/>
           </a:p>
@@ -2861,7 +2862,7 @@
           <a:p>
             <a:fld id="{48A87A34-81AB-432B-8DAE-1953F412C126}" type="datetimeFigureOut">
               <a:rPr lang="en-US" dirty="0"/>
-              <a:t>11/14/19</a:t>
+              <a:t>2/10/20</a:t>
             </a:fld>
             <a:endParaRPr lang="en-US" dirty="0"/>
           </a:p>
@@ -3031,7 +3032,7 @@
           <a:p>
             <a:fld id="{48A87A34-81AB-432B-8DAE-1953F412C126}" type="datetimeFigureOut">
               <a:rPr lang="en-US" dirty="0"/>
-              <a:t>11/14/19</a:t>
+              <a:t>2/10/20</a:t>
             </a:fld>
             <a:endParaRPr lang="en-US" dirty="0"/>
           </a:p>
@@ -3250,7 +3251,7 @@
             <a:fld id="{48A87A34-81AB-432B-8DAE-1953F412C126}" type="datetimeFigureOut">
               <a:rPr lang="en-US" dirty="0"/>
               <a:pPr/>
-              <a:t>11/14/19</a:t>
+              <a:t>2/10/20</a:t>
             </a:fld>
             <a:endParaRPr lang="en-US" dirty="0"/>
           </a:p>
@@ -3425,7 +3426,7 @@
           <a:p>
             <a:fld id="{48A87A34-81AB-432B-8DAE-1953F412C126}" type="datetimeFigureOut">
               <a:rPr lang="en-US" dirty="0"/>
-              <a:t>11/14/19</a:t>
+              <a:t>2/10/20</a:t>
             </a:fld>
             <a:endParaRPr lang="en-US" dirty="0"/>
           </a:p>
@@ -3710,7 +3711,7 @@
             <a:fld id="{48A87A34-81AB-432B-8DAE-1953F412C126}" type="datetimeFigureOut">
               <a:rPr lang="en-US" dirty="0"/>
               <a:pPr/>
-              <a:t>11/14/19</a:t>
+              <a:t>2/10/20</a:t>
             </a:fld>
             <a:endParaRPr lang="en-US" dirty="0"/>
           </a:p>
@@ -3947,7 +3948,7 @@
           <a:p>
             <a:fld id="{48A87A34-81AB-432B-8DAE-1953F412C126}" type="datetimeFigureOut">
               <a:rPr lang="en-US" dirty="0"/>
-              <a:t>11/14/19</a:t>
+              <a:t>2/10/20</a:t>
             </a:fld>
             <a:endParaRPr lang="en-US" dirty="0"/>
           </a:p>
@@ -4321,7 +4322,7 @@
           <a:p>
             <a:fld id="{48A87A34-81AB-432B-8DAE-1953F412C126}" type="datetimeFigureOut">
               <a:rPr lang="en-US" dirty="0"/>
-              <a:t>11/14/19</a:t>
+              <a:t>2/10/20</a:t>
             </a:fld>
             <a:endParaRPr lang="en-US" dirty="0"/>
           </a:p>
@@ -4434,7 +4435,7 @@
           <a:p>
             <a:fld id="{48A87A34-81AB-432B-8DAE-1953F412C126}" type="datetimeFigureOut">
               <a:rPr lang="en-US" dirty="0"/>
-              <a:t>11/14/19</a:t>
+              <a:t>2/10/20</a:t>
             </a:fld>
             <a:endParaRPr lang="en-US" dirty="0"/>
           </a:p>
@@ -4524,7 +4525,7 @@
           <a:p>
             <a:fld id="{48A87A34-81AB-432B-8DAE-1953F412C126}" type="datetimeFigureOut">
               <a:rPr lang="en-US" dirty="0"/>
-              <a:t>11/14/19</a:t>
+              <a:t>2/10/20</a:t>
             </a:fld>
             <a:endParaRPr lang="en-US" dirty="0"/>
           </a:p>
@@ -4768,7 +4769,7 @@
           <a:p>
             <a:fld id="{48A87A34-81AB-432B-8DAE-1953F412C126}" type="datetimeFigureOut">
               <a:rPr lang="en-US" dirty="0"/>
-              <a:t>11/14/19</a:t>
+              <a:t>2/10/20</a:t>
             </a:fld>
             <a:endParaRPr lang="en-US" dirty="0"/>
           </a:p>
@@ -5020,7 +5021,7 @@
           <a:p>
             <a:fld id="{48A87A34-81AB-432B-8DAE-1953F412C126}" type="datetimeFigureOut">
               <a:rPr lang="en-US" dirty="0"/>
-              <a:t>11/14/19</a:t>
+              <a:t>2/10/20</a:t>
             </a:fld>
             <a:endParaRPr lang="en-US" dirty="0"/>
           </a:p>
@@ -5259,7 +5260,7 @@
             <a:fld id="{48A87A34-81AB-432B-8DAE-1953F412C126}" type="datetimeFigureOut">
               <a:rPr lang="en-US" dirty="0"/>
               <a:pPr/>
-              <a:t>11/14/19</a:t>
+              <a:t>2/10/20</a:t>
             </a:fld>
             <a:endParaRPr lang="en-US" dirty="0"/>
           </a:p>
@@ -7030,6 +7031,378 @@
           <p:cNvPr id="2" name="Title 1">
             <a:extLst>
               <a:ext uri="{FF2B5EF4-FFF2-40B4-BE49-F238E27FC236}">
+                <a16:creationId xmlns:a16="http://schemas.microsoft.com/office/drawing/2014/main" id="{24CC337F-F411-9C41-B750-AD58138C4DD0}"/>
+              </a:ext>
+            </a:extLst>
+          </p:cNvPr>
+          <p:cNvSpPr>
+            <a:spLocks noGrp="1"/>
+          </p:cNvSpPr>
+          <p:nvPr>
+            <p:ph type="title"/>
+          </p:nvPr>
+        </p:nvSpPr>
+        <p:spPr/>
+        <p:txBody>
+          <a:bodyPr/>
+          <a:lstStyle/>
+          <a:p>
+            <a:r>
+              <a:rPr lang="en-US" dirty="0" err="1">
+                <a:latin typeface="Arial" panose="020B0604020202020204" pitchFamily="34" charset="0"/>
+                <a:cs typeface="Arial" panose="020B0604020202020204" pitchFamily="34" charset="0"/>
+              </a:rPr>
+              <a:t>Ví</a:t>
+            </a:r>
+            <a:r>
+              <a:rPr lang="en-US" dirty="0">
+                <a:latin typeface="Arial" panose="020B0604020202020204" pitchFamily="34" charset="0"/>
+                <a:cs typeface="Arial" panose="020B0604020202020204" pitchFamily="34" charset="0"/>
+              </a:rPr>
+              <a:t> </a:t>
+            </a:r>
+            <a:r>
+              <a:rPr lang="en-US" dirty="0" err="1">
+                <a:latin typeface="Arial" panose="020B0604020202020204" pitchFamily="34" charset="0"/>
+                <a:cs typeface="Arial" panose="020B0604020202020204" pitchFamily="34" charset="0"/>
+              </a:rPr>
+              <a:t>dụ</a:t>
+            </a:r>
+            <a:endParaRPr lang="en-US" dirty="0">
+              <a:latin typeface="Arial" panose="020B0604020202020204" pitchFamily="34" charset="0"/>
+              <a:cs typeface="Arial" panose="020B0604020202020204" pitchFamily="34" charset="0"/>
+            </a:endParaRPr>
+          </a:p>
+        </p:txBody>
+      </p:sp>
+      <p:sp>
+        <p:nvSpPr>
+          <p:cNvPr id="3" name="Content Placeholder 2">
+            <a:extLst>
+              <a:ext uri="{FF2B5EF4-FFF2-40B4-BE49-F238E27FC236}">
+                <a16:creationId xmlns:a16="http://schemas.microsoft.com/office/drawing/2014/main" id="{6FA1D106-B6F2-8344-91A3-FC7D0A3B7DF2}"/>
+              </a:ext>
+            </a:extLst>
+          </p:cNvPr>
+          <p:cNvSpPr>
+            <a:spLocks noGrp="1"/>
+          </p:cNvSpPr>
+          <p:nvPr>
+            <p:ph idx="1"/>
+          </p:nvPr>
+        </p:nvSpPr>
+        <p:spPr/>
+        <p:txBody>
+          <a:bodyPr>
+            <a:normAutofit fontScale="85000" lnSpcReduction="20000"/>
+          </a:bodyPr>
+          <a:lstStyle/>
+          <a:p>
+            <a:pPr>
+              <a:lnSpc>
+                <a:spcPct val="150000"/>
+              </a:lnSpc>
+            </a:pPr>
+            <a:r>
+              <a:rPr lang="en-US" dirty="0" err="1">
+                <a:latin typeface="Arial" panose="020B0604020202020204" pitchFamily="34" charset="0"/>
+                <a:cs typeface="Arial" panose="020B0604020202020204" pitchFamily="34" charset="0"/>
+              </a:rPr>
+              <a:t>Tạo</a:t>
+            </a:r>
+            <a:r>
+              <a:rPr lang="en-US" dirty="0">
+                <a:latin typeface="Arial" panose="020B0604020202020204" pitchFamily="34" charset="0"/>
+                <a:cs typeface="Arial" panose="020B0604020202020204" pitchFamily="34" charset="0"/>
+              </a:rPr>
+              <a:t> URL </a:t>
+            </a:r>
+            <a:r>
+              <a:rPr lang="en-US" dirty="0" err="1">
+                <a:latin typeface="Arial" panose="020B0604020202020204" pitchFamily="34" charset="0"/>
+                <a:cs typeface="Arial" panose="020B0604020202020204" pitchFamily="34" charset="0"/>
+              </a:rPr>
+              <a:t>là</a:t>
+            </a:r>
+            <a:r>
+              <a:rPr lang="en-US" dirty="0">
+                <a:latin typeface="Arial" panose="020B0604020202020204" pitchFamily="34" charset="0"/>
+                <a:cs typeface="Arial" panose="020B0604020202020204" pitchFamily="34" charset="0"/>
+              </a:rPr>
+              <a:t> link </a:t>
+            </a:r>
+            <a:r>
+              <a:rPr lang="en-US" dirty="0" err="1">
+                <a:latin typeface="Arial" panose="020B0604020202020204" pitchFamily="34" charset="0"/>
+                <a:cs typeface="Arial" panose="020B0604020202020204" pitchFamily="34" charset="0"/>
+              </a:rPr>
+              <a:t>đê</a:t>
+            </a:r>
+            <a:r>
+              <a:rPr lang="en-US" dirty="0">
+                <a:latin typeface="Arial" panose="020B0604020202020204" pitchFamily="34" charset="0"/>
+                <a:cs typeface="Arial" panose="020B0604020202020204" pitchFamily="34" charset="0"/>
+              </a:rPr>
+              <a:t> request:</a:t>
+            </a:r>
+          </a:p>
+          <a:p>
+            <a:pPr marL="0" indent="0">
+              <a:buNone/>
+            </a:pPr>
+            <a:r>
+              <a:rPr lang="en-US" sz="1400" dirty="0"/>
+              <a:t>	 let </a:t>
+            </a:r>
+            <a:r>
+              <a:rPr lang="en-US" sz="1400" dirty="0" err="1"/>
+              <a:t>urlString</a:t>
+            </a:r>
+            <a:r>
+              <a:rPr lang="en-US" sz="1400" dirty="0"/>
+              <a:t>= String(format: "http://</a:t>
+            </a:r>
+            <a:r>
+              <a:rPr lang="en-US" sz="1400" dirty="0" err="1"/>
+              <a:t>dummy.restapiexample.com</a:t>
+            </a:r>
+            <a:r>
+              <a:rPr lang="en-US" sz="1400" dirty="0"/>
+              <a:t>/</a:t>
+            </a:r>
+            <a:r>
+              <a:rPr lang="en-US" sz="1400" dirty="0" err="1"/>
+              <a:t>api</a:t>
+            </a:r>
+            <a:r>
+              <a:rPr lang="en-US" sz="1400" dirty="0"/>
+              <a:t>/v1/employees")</a:t>
+            </a:r>
+          </a:p>
+          <a:p>
+            <a:pPr marL="0" indent="0">
+              <a:buNone/>
+            </a:pPr>
+            <a:r>
+              <a:rPr lang="en-US" sz="1400" dirty="0"/>
+              <a:t>        	guard let </a:t>
+            </a:r>
+            <a:r>
+              <a:rPr lang="en-US" sz="1400" dirty="0" err="1"/>
+              <a:t>serviceUrl</a:t>
+            </a:r>
+            <a:r>
+              <a:rPr lang="en-US" sz="1400" dirty="0"/>
+              <a:t> = URL(string: </a:t>
+            </a:r>
+            <a:r>
+              <a:rPr lang="en-US" sz="1400" dirty="0" err="1"/>
+              <a:t>urlString</a:t>
+            </a:r>
+            <a:r>
+              <a:rPr lang="en-US" sz="1400" dirty="0"/>
+              <a:t>) else { return }</a:t>
+            </a:r>
+          </a:p>
+          <a:p>
+            <a:pPr>
+              <a:lnSpc>
+                <a:spcPct val="150000"/>
+              </a:lnSpc>
+            </a:pPr>
+            <a:r>
+              <a:rPr lang="en-US" dirty="0" err="1">
+                <a:latin typeface="Arial" panose="020B0604020202020204" pitchFamily="34" charset="0"/>
+                <a:cs typeface="Arial" panose="020B0604020202020204" pitchFamily="34" charset="0"/>
+              </a:rPr>
+              <a:t>Tạo</a:t>
+            </a:r>
+            <a:r>
+              <a:rPr lang="en-US" dirty="0">
+                <a:latin typeface="Arial" panose="020B0604020202020204" pitchFamily="34" charset="0"/>
+                <a:cs typeface="Arial" panose="020B0604020202020204" pitchFamily="34" charset="0"/>
+              </a:rPr>
+              <a:t> Request:</a:t>
+            </a:r>
+          </a:p>
+          <a:p>
+            <a:pPr marL="457200" lvl="1" indent="0">
+              <a:lnSpc>
+                <a:spcPct val="150000"/>
+              </a:lnSpc>
+              <a:buNone/>
+            </a:pPr>
+            <a:r>
+              <a:rPr lang="en-US" sz="1500" dirty="0"/>
+              <a:t>	let request = </a:t>
+            </a:r>
+            <a:r>
+              <a:rPr lang="en-US" sz="1500" dirty="0" err="1"/>
+              <a:t>URLRequest</a:t>
+            </a:r>
+            <a:r>
+              <a:rPr lang="en-US" sz="1500" dirty="0"/>
+              <a:t>(</a:t>
+            </a:r>
+            <a:r>
+              <a:rPr lang="en-US" sz="1500" dirty="0" err="1"/>
+              <a:t>url</a:t>
+            </a:r>
+            <a:r>
+              <a:rPr lang="en-US" sz="1500" dirty="0"/>
+              <a:t>: </a:t>
+            </a:r>
+            <a:r>
+              <a:rPr lang="en-US" sz="1500" dirty="0" err="1"/>
+              <a:t>serviceUrl</a:t>
+            </a:r>
+            <a:r>
+              <a:rPr lang="en-US" sz="1500" dirty="0"/>
+              <a:t>)</a:t>
+            </a:r>
+            <a:endParaRPr lang="en-US" dirty="0">
+              <a:latin typeface="Arial" panose="020B0604020202020204" pitchFamily="34" charset="0"/>
+              <a:cs typeface="Arial" panose="020B0604020202020204" pitchFamily="34" charset="0"/>
+            </a:endParaRPr>
+          </a:p>
+          <a:p>
+            <a:pPr>
+              <a:lnSpc>
+                <a:spcPct val="150000"/>
+              </a:lnSpc>
+            </a:pPr>
+            <a:r>
+              <a:rPr lang="en-US" dirty="0" err="1">
+                <a:latin typeface="Arial" panose="020B0604020202020204" pitchFamily="34" charset="0"/>
+                <a:cs typeface="Arial" panose="020B0604020202020204" pitchFamily="34" charset="0"/>
+              </a:rPr>
+              <a:t>Thực</a:t>
+            </a:r>
+            <a:r>
+              <a:rPr lang="en-US" dirty="0">
+                <a:latin typeface="Arial" panose="020B0604020202020204" pitchFamily="34" charset="0"/>
+                <a:cs typeface="Arial" panose="020B0604020202020204" pitchFamily="34" charset="0"/>
+              </a:rPr>
+              <a:t> </a:t>
+            </a:r>
+            <a:r>
+              <a:rPr lang="en-US" dirty="0" err="1">
+                <a:latin typeface="Arial" panose="020B0604020202020204" pitchFamily="34" charset="0"/>
+                <a:cs typeface="Arial" panose="020B0604020202020204" pitchFamily="34" charset="0"/>
+              </a:rPr>
+              <a:t>hiện</a:t>
+            </a:r>
+            <a:r>
+              <a:rPr lang="en-US" dirty="0">
+                <a:latin typeface="Arial" panose="020B0604020202020204" pitchFamily="34" charset="0"/>
+                <a:cs typeface="Arial" panose="020B0604020202020204" pitchFamily="34" charset="0"/>
+              </a:rPr>
+              <a:t> request:</a:t>
+            </a:r>
+          </a:p>
+          <a:p>
+            <a:pPr marL="0" indent="0">
+              <a:buNone/>
+            </a:pPr>
+            <a:r>
+              <a:rPr lang="en-US" sz="2000" dirty="0"/>
+              <a:t>	let session = </a:t>
+            </a:r>
+            <a:r>
+              <a:rPr lang="en-US" sz="2000" dirty="0" err="1"/>
+              <a:t>URLSession.shared</a:t>
+            </a:r>
+            <a:endParaRPr lang="en-US" sz="2000" dirty="0"/>
+          </a:p>
+          <a:p>
+            <a:pPr marL="0" indent="0">
+              <a:buNone/>
+            </a:pPr>
+            <a:r>
+              <a:rPr lang="en-US" sz="2000" dirty="0"/>
+              <a:t>        	</a:t>
+            </a:r>
+            <a:r>
+              <a:rPr lang="en-US" sz="2000" dirty="0" err="1"/>
+              <a:t>session.dataTask</a:t>
+            </a:r>
+            <a:r>
+              <a:rPr lang="en-US" sz="2000" dirty="0"/>
+              <a:t>(with: request) { (data, response, error) in</a:t>
+            </a:r>
+          </a:p>
+          <a:p>
+            <a:pPr marL="0" indent="0">
+              <a:buNone/>
+            </a:pPr>
+            <a:r>
+              <a:rPr lang="en-US" sz="2000" dirty="0"/>
+              <a:t>           		 print(data?.</a:t>
+            </a:r>
+            <a:r>
+              <a:rPr lang="en-US" sz="2000" dirty="0" err="1"/>
+              <a:t>toString</a:t>
+            </a:r>
+            <a:r>
+              <a:rPr lang="en-US" sz="2000" dirty="0"/>
+              <a:t>())</a:t>
+            </a:r>
+          </a:p>
+          <a:p>
+            <a:pPr marL="0" indent="0">
+              <a:buNone/>
+            </a:pPr>
+            <a:r>
+              <a:rPr lang="en-US" sz="2000" dirty="0"/>
+              <a:t>            		//update UI =&gt; callback</a:t>
+            </a:r>
+          </a:p>
+          <a:p>
+            <a:pPr marL="0" indent="0">
+              <a:buNone/>
+            </a:pPr>
+            <a:r>
+              <a:rPr lang="en-US" sz="2000" dirty="0"/>
+              <a:t>        	}.resume()</a:t>
+            </a:r>
+          </a:p>
+        </p:txBody>
+      </p:sp>
+    </p:spTree>
+    <p:extLst>
+      <p:ext uri="{BB962C8B-B14F-4D97-AF65-F5344CB8AC3E}">
+        <p14:creationId xmlns:p14="http://schemas.microsoft.com/office/powerpoint/2010/main" val="1990752251"/>
+      </p:ext>
+    </p:extLst>
+  </p:cSld>
+  <p:clrMapOvr>
+    <a:masterClrMapping/>
+  </p:clrMapOvr>
+</p:sld>
+</file>
+
+<file path=ppt/slides/slide6.xml><?xml version="1.0" encoding="utf-8"?>
+<p:sld xmlns:a="http://schemas.openxmlformats.org/drawingml/2006/main" xmlns:r="http://schemas.openxmlformats.org/officeDocument/2006/relationships" xmlns:p="http://schemas.openxmlformats.org/presentationml/2006/main">
+  <p:cSld>
+    <p:spTree>
+      <p:nvGrpSpPr>
+        <p:cNvPr id="1" name=""/>
+        <p:cNvGrpSpPr/>
+        <p:nvPr/>
+      </p:nvGrpSpPr>
+      <p:grpSpPr>
+        <a:xfrm>
+          <a:off x="0" y="0"/>
+          <a:ext cx="0" cy="0"/>
+          <a:chOff x="0" y="0"/>
+          <a:chExt cx="0" cy="0"/>
+        </a:xfrm>
+      </p:grpSpPr>
+      <p:sp>
+        <p:nvSpPr>
+          <p:cNvPr id="2" name="Title 1">
+            <a:extLst>
+              <a:ext uri="{FF2B5EF4-FFF2-40B4-BE49-F238E27FC236}">
                 <a16:creationId xmlns:a16="http://schemas.microsoft.com/office/drawing/2014/main" id="{D729B2AA-F155-5242-B907-33863C9D0C58}"/>
               </a:ext>
             </a:extLst>

</xml_diff>